<commit_message>
Added Cook Park name change
Added Cook Park name change
</commit_message>
<xml_diff>
--- a/images/Map.pptx
+++ b/images/Map.pptx
@@ -104,6 +104,11 @@
       </a:defRPr>
     </a:lvl9pPr>
   </p:defaultTextStyle>
+  <p:extLst>
+    <p:ext uri="{EFAFB233-063F-42B5-8137-9DF3F51BA10A}">
+      <p15:sldGuideLst xmlns:p15="http://schemas.microsoft.com/office/powerpoint/2012/main"/>
+    </p:ext>
+  </p:extLst>
 </p:presentation>
 </file>
 
@@ -152,7 +157,6 @@
               <a:rPr lang="en-US"/>
               <a:t>Click to edit Master title style</a:t>
             </a:r>
-            <a:endParaRPr lang="en-US"/>
           </a:p>
         </p:txBody>
       </p:sp>
@@ -217,7 +221,6 @@
               <a:rPr lang="en-US"/>
               <a:t>Click to edit Master subtitle style</a:t>
             </a:r>
-            <a:endParaRPr lang="en-US"/>
           </a:p>
         </p:txBody>
       </p:sp>
@@ -238,7 +241,7 @@
           <a:p>
             <a:fld id="{F3A38904-A649-4555-816C-AAAF2A3DA954}" type="datetimeFigureOut">
               <a:rPr lang="en-US" smtClean="0"/>
-              <a:t>12/1/2016</a:t>
+              <a:t>12/6/16</a:t>
             </a:fld>
             <a:endParaRPr lang="en-US"/>
           </a:p>
@@ -335,7 +338,6 @@
               <a:rPr lang="en-US"/>
               <a:t>Click to edit Master title style</a:t>
             </a:r>
-            <a:endParaRPr lang="en-US"/>
           </a:p>
         </p:txBody>
       </p:sp>
@@ -387,7 +389,6 @@
               <a:rPr lang="en-US"/>
               <a:t>Fifth level</a:t>
             </a:r>
-            <a:endParaRPr lang="en-US"/>
           </a:p>
         </p:txBody>
       </p:sp>
@@ -408,7 +409,7 @@
           <a:p>
             <a:fld id="{F3A38904-A649-4555-816C-AAAF2A3DA954}" type="datetimeFigureOut">
               <a:rPr lang="en-US" smtClean="0"/>
-              <a:t>12/1/2016</a:t>
+              <a:t>12/6/16</a:t>
             </a:fld>
             <a:endParaRPr lang="en-US"/>
           </a:p>
@@ -510,7 +511,6 @@
               <a:rPr lang="en-US"/>
               <a:t>Click to edit Master title style</a:t>
             </a:r>
-            <a:endParaRPr lang="en-US"/>
           </a:p>
         </p:txBody>
       </p:sp>
@@ -567,7 +567,6 @@
               <a:rPr lang="en-US"/>
               <a:t>Fifth level</a:t>
             </a:r>
-            <a:endParaRPr lang="en-US"/>
           </a:p>
         </p:txBody>
       </p:sp>
@@ -588,7 +587,7 @@
           <a:p>
             <a:fld id="{F3A38904-A649-4555-816C-AAAF2A3DA954}" type="datetimeFigureOut">
               <a:rPr lang="en-US" smtClean="0"/>
-              <a:t>12/1/2016</a:t>
+              <a:t>12/6/16</a:t>
             </a:fld>
             <a:endParaRPr lang="en-US"/>
           </a:p>
@@ -685,7 +684,6 @@
               <a:rPr lang="en-US"/>
               <a:t>Click to edit Master title style</a:t>
             </a:r>
-            <a:endParaRPr lang="en-US"/>
           </a:p>
         </p:txBody>
       </p:sp>
@@ -737,7 +735,6 @@
               <a:rPr lang="en-US"/>
               <a:t>Fifth level</a:t>
             </a:r>
-            <a:endParaRPr lang="en-US"/>
           </a:p>
         </p:txBody>
       </p:sp>
@@ -758,7 +755,7 @@
           <a:p>
             <a:fld id="{F3A38904-A649-4555-816C-AAAF2A3DA954}" type="datetimeFigureOut">
               <a:rPr lang="en-US" smtClean="0"/>
-              <a:t>12/1/2016</a:t>
+              <a:t>12/6/16</a:t>
             </a:fld>
             <a:endParaRPr lang="en-US"/>
           </a:p>
@@ -864,7 +861,6 @@
               <a:rPr lang="en-US"/>
               <a:t>Click to edit Master title style</a:t>
             </a:r>
-            <a:endParaRPr lang="en-US"/>
           </a:p>
         </p:txBody>
       </p:sp>
@@ -1004,7 +1000,7 @@
           <a:p>
             <a:fld id="{F3A38904-A649-4555-816C-AAAF2A3DA954}" type="datetimeFigureOut">
               <a:rPr lang="en-US" smtClean="0"/>
-              <a:t>12/1/2016</a:t>
+              <a:t>12/6/16</a:t>
             </a:fld>
             <a:endParaRPr lang="en-US"/>
           </a:p>
@@ -1101,7 +1097,6 @@
               <a:rPr lang="en-US"/>
               <a:t>Click to edit Master title style</a:t>
             </a:r>
-            <a:endParaRPr lang="en-US"/>
           </a:p>
         </p:txBody>
       </p:sp>
@@ -1158,7 +1153,6 @@
               <a:rPr lang="en-US"/>
               <a:t>Fifth level</a:t>
             </a:r>
-            <a:endParaRPr lang="en-US"/>
           </a:p>
         </p:txBody>
       </p:sp>
@@ -1215,7 +1209,6 @@
               <a:rPr lang="en-US"/>
               <a:t>Fifth level</a:t>
             </a:r>
-            <a:endParaRPr lang="en-US"/>
           </a:p>
         </p:txBody>
       </p:sp>
@@ -1236,7 +1229,7 @@
           <a:p>
             <a:fld id="{F3A38904-A649-4555-816C-AAAF2A3DA954}" type="datetimeFigureOut">
               <a:rPr lang="en-US" smtClean="0"/>
-              <a:t>12/1/2016</a:t>
+              <a:t>12/6/16</a:t>
             </a:fld>
             <a:endParaRPr lang="en-US"/>
           </a:p>
@@ -1338,7 +1331,6 @@
               <a:rPr lang="en-US"/>
               <a:t>Click to edit Master title style</a:t>
             </a:r>
-            <a:endParaRPr lang="en-US"/>
           </a:p>
         </p:txBody>
       </p:sp>
@@ -1460,7 +1452,6 @@
               <a:rPr lang="en-US"/>
               <a:t>Fifth level</a:t>
             </a:r>
-            <a:endParaRPr lang="en-US"/>
           </a:p>
         </p:txBody>
       </p:sp>
@@ -1582,7 +1573,6 @@
               <a:rPr lang="en-US"/>
               <a:t>Fifth level</a:t>
             </a:r>
-            <a:endParaRPr lang="en-US"/>
           </a:p>
         </p:txBody>
       </p:sp>
@@ -1603,7 +1593,7 @@
           <a:p>
             <a:fld id="{F3A38904-A649-4555-816C-AAAF2A3DA954}" type="datetimeFigureOut">
               <a:rPr lang="en-US" smtClean="0"/>
-              <a:t>12/1/2016</a:t>
+              <a:t>12/6/16</a:t>
             </a:fld>
             <a:endParaRPr lang="en-US"/>
           </a:p>
@@ -1700,7 +1690,6 @@
               <a:rPr lang="en-US"/>
               <a:t>Click to edit Master title style</a:t>
             </a:r>
-            <a:endParaRPr lang="en-US"/>
           </a:p>
         </p:txBody>
       </p:sp>
@@ -1721,7 +1710,7 @@
           <a:p>
             <a:fld id="{F3A38904-A649-4555-816C-AAAF2A3DA954}" type="datetimeFigureOut">
               <a:rPr lang="en-US" smtClean="0"/>
-              <a:t>12/1/2016</a:t>
+              <a:t>12/6/16</a:t>
             </a:fld>
             <a:endParaRPr lang="en-US"/>
           </a:p>
@@ -1816,7 +1805,7 @@
           <a:p>
             <a:fld id="{F3A38904-A649-4555-816C-AAAF2A3DA954}" type="datetimeFigureOut">
               <a:rPr lang="en-US" smtClean="0"/>
-              <a:t>12/1/2016</a:t>
+              <a:t>12/6/16</a:t>
             </a:fld>
             <a:endParaRPr lang="en-US"/>
           </a:p>
@@ -1922,7 +1911,6 @@
               <a:rPr lang="en-US"/>
               <a:t>Click to edit Master title style</a:t>
             </a:r>
-            <a:endParaRPr lang="en-US"/>
           </a:p>
         </p:txBody>
       </p:sp>
@@ -2007,7 +1995,6 @@
               <a:rPr lang="en-US"/>
               <a:t>Fifth level</a:t>
             </a:r>
-            <a:endParaRPr lang="en-US"/>
           </a:p>
         </p:txBody>
       </p:sp>
@@ -2093,7 +2080,7 @@
           <a:p>
             <a:fld id="{F3A38904-A649-4555-816C-AAAF2A3DA954}" type="datetimeFigureOut">
               <a:rPr lang="en-US" smtClean="0"/>
-              <a:t>12/1/2016</a:t>
+              <a:t>12/6/16</a:t>
             </a:fld>
             <a:endParaRPr lang="en-US"/>
           </a:p>
@@ -2199,7 +2186,6 @@
               <a:rPr lang="en-US"/>
               <a:t>Click to edit Master title style</a:t>
             </a:r>
-            <a:endParaRPr lang="en-US"/>
           </a:p>
         </p:txBody>
       </p:sp>
@@ -2346,7 +2332,7 @@
           <a:p>
             <a:fld id="{F3A38904-A649-4555-816C-AAAF2A3DA954}" type="datetimeFigureOut">
               <a:rPr lang="en-US" smtClean="0"/>
-              <a:t>12/1/2016</a:t>
+              <a:t>12/6/16</a:t>
             </a:fld>
             <a:endParaRPr lang="en-US"/>
           </a:p>
@@ -2458,7 +2444,6 @@
               <a:rPr lang="en-US"/>
               <a:t>Click to edit Master title style</a:t>
             </a:r>
-            <a:endParaRPr lang="en-US"/>
           </a:p>
         </p:txBody>
       </p:sp>
@@ -2520,7 +2505,6 @@
               <a:rPr lang="en-US"/>
               <a:t>Fifth level</a:t>
             </a:r>
-            <a:endParaRPr lang="en-US"/>
           </a:p>
         </p:txBody>
       </p:sp>
@@ -2559,7 +2543,7 @@
           <a:p>
             <a:fld id="{F3A38904-A649-4555-816C-AAAF2A3DA954}" type="datetimeFigureOut">
               <a:rPr lang="en-US" smtClean="0"/>
-              <a:t>12/1/2016</a:t>
+              <a:t>12/6/16</a:t>
             </a:fld>
             <a:endParaRPr lang="en-US"/>
           </a:p>
@@ -3046,11 +3030,14 @@
             <a:p>
               <a:pPr algn="ctr"/>
               <a:r>
-                <a:rPr lang="en-US" sz="4300" dirty="0">
+                <a:rPr lang="en-US" sz="4300" dirty="0" smtClean="0">
                   <a:latin typeface="Rockwell" panose="02060603020205020403" pitchFamily="18" charset="0"/>
                 </a:rPr>
-                <a:t>Historic Mims Park</a:t>
+                <a:t>Cook Park</a:t>
               </a:r>
+              <a:endParaRPr lang="en-US" sz="4300" dirty="0">
+                <a:latin typeface="Rockwell" panose="02060603020205020403" pitchFamily="18" charset="0"/>
+              </a:endParaRPr>
             </a:p>
           </p:txBody>
         </p:sp>

</xml_diff>